<commit_message>
Atualização do Power Point de apresentação.
</commit_message>
<xml_diff>
--- a/Power Point/apresentacao.pptx
+++ b/Power Point/apresentacao.pptx
@@ -8,12 +8,13 @@
     <p:sldId id="263" r:id="rId2"/>
     <p:sldId id="256" r:id="rId3"/>
     <p:sldId id="262" r:id="rId4"/>
-    <p:sldId id="257" r:id="rId5"/>
-    <p:sldId id="261" r:id="rId6"/>
-    <p:sldId id="258" r:id="rId7"/>
-    <p:sldId id="260" r:id="rId8"/>
-    <p:sldId id="266" r:id="rId9"/>
-    <p:sldId id="265" r:id="rId10"/>
+    <p:sldId id="261" r:id="rId5"/>
+    <p:sldId id="258" r:id="rId6"/>
+    <p:sldId id="260" r:id="rId7"/>
+    <p:sldId id="257" r:id="rId8"/>
+    <p:sldId id="267" r:id="rId9"/>
+    <p:sldId id="266" r:id="rId10"/>
+    <p:sldId id="265" r:id="rId11"/>
   </p:sldIdLst>
   <p:sldSz cx="12192000" cy="6858000"/>
   <p:notesSz cx="6858000" cy="9144000"/>
@@ -118,6 +119,175 @@
     </p:ext>
   </p:extLst>
 </p:presentation>
+</file>
+
+<file path=ppt/revisionInfo.xml><?xml version="1.0" encoding="utf-8"?>
+<p1510:revInfo xmlns:a="http://schemas.openxmlformats.org/drawingml/2006/main" xmlns:r="http://schemas.openxmlformats.org/officeDocument/2006/relationships" xmlns:p1510="http://schemas.microsoft.com/office/powerpoint/2015/10/main">
+  <p1510:revLst>
+    <p1510:client id="{4F74A316-CE39-4334-8D64-99330089639C}" v="2" dt="2021-07-16T16:31:40.324"/>
+  </p1510:revLst>
+</p1510:revInfo>
+</file>
+
+<file path=ppt/changesInfos/changesInfo1.xml><?xml version="1.0" encoding="utf-8"?>
+<pc:chgInfo xmlns:a="http://schemas.openxmlformats.org/drawingml/2006/main" xmlns:r="http://schemas.openxmlformats.org/officeDocument/2006/relationships" xmlns:ac="http://schemas.microsoft.com/office/drawing/2013/main/command" xmlns:pc="http://schemas.microsoft.com/office/powerpoint/2013/main/command">
+  <pc:docChgLst>
+    <pc:chgData name="Luiz Phelipe Utiama Sempreboni" userId="3f5f3216-6838-42b4-8f95-953f983fe7ed" providerId="ADAL" clId="{4F74A316-CE39-4334-8D64-99330089639C}"/>
+    <pc:docChg chg="undo redo custSel addSld modSld sldOrd">
+      <pc:chgData name="Luiz Phelipe Utiama Sempreboni" userId="3f5f3216-6838-42b4-8f95-953f983fe7ed" providerId="ADAL" clId="{4F74A316-CE39-4334-8D64-99330089639C}" dt="2021-07-16T16:48:36.835" v="245" actId="14861"/>
+      <pc:docMkLst>
+        <pc:docMk/>
+      </pc:docMkLst>
+      <pc:sldChg chg="addSp delSp modSp mod">
+        <pc:chgData name="Luiz Phelipe Utiama Sempreboni" userId="3f5f3216-6838-42b4-8f95-953f983fe7ed" providerId="ADAL" clId="{4F74A316-CE39-4334-8D64-99330089639C}" dt="2021-07-16T16:48:36.835" v="245" actId="14861"/>
+        <pc:sldMkLst>
+          <pc:docMk/>
+          <pc:sldMk cId="4204563038" sldId="256"/>
+        </pc:sldMkLst>
+        <pc:picChg chg="add del mod">
+          <ac:chgData name="Luiz Phelipe Utiama Sempreboni" userId="3f5f3216-6838-42b4-8f95-953f983fe7ed" providerId="ADAL" clId="{4F74A316-CE39-4334-8D64-99330089639C}" dt="2021-07-16T16:48:28.187" v="241" actId="478"/>
+          <ac:picMkLst>
+            <pc:docMk/>
+            <pc:sldMk cId="4204563038" sldId="256"/>
+            <ac:picMk id="3" creationId="{B52137AC-BA18-49B6-9BD8-AA0EA43D7EE8}"/>
+          </ac:picMkLst>
+        </pc:picChg>
+        <pc:picChg chg="add mod">
+          <ac:chgData name="Luiz Phelipe Utiama Sempreboni" userId="3f5f3216-6838-42b4-8f95-953f983fe7ed" providerId="ADAL" clId="{4F74A316-CE39-4334-8D64-99330089639C}" dt="2021-07-16T16:47:44.761" v="238" actId="1076"/>
+          <ac:picMkLst>
+            <pc:docMk/>
+            <pc:sldMk cId="4204563038" sldId="256"/>
+            <ac:picMk id="5" creationId="{0C417362-9A6B-4378-9C14-5C1C8D00EBA8}"/>
+          </ac:picMkLst>
+        </pc:picChg>
+        <pc:picChg chg="add mod">
+          <ac:chgData name="Luiz Phelipe Utiama Sempreboni" userId="3f5f3216-6838-42b4-8f95-953f983fe7ed" providerId="ADAL" clId="{4F74A316-CE39-4334-8D64-99330089639C}" dt="2021-07-16T16:48:36.835" v="245" actId="14861"/>
+          <ac:picMkLst>
+            <pc:docMk/>
+            <pc:sldMk cId="4204563038" sldId="256"/>
+            <ac:picMk id="7" creationId="{5592873E-418D-44A9-B648-DD6D1EEBCF56}"/>
+          </ac:picMkLst>
+        </pc:picChg>
+        <pc:picChg chg="del">
+          <ac:chgData name="Luiz Phelipe Utiama Sempreboni" userId="3f5f3216-6838-42b4-8f95-953f983fe7ed" providerId="ADAL" clId="{4F74A316-CE39-4334-8D64-99330089639C}" dt="2021-07-16T16:39:59.793" v="226" actId="478"/>
+          <ac:picMkLst>
+            <pc:docMk/>
+            <pc:sldMk cId="4204563038" sldId="256"/>
+            <ac:picMk id="9" creationId="{72CF7D43-EF37-43BC-9411-EF70B82136ED}"/>
+          </ac:picMkLst>
+        </pc:picChg>
+      </pc:sldChg>
+      <pc:sldChg chg="ord">
+        <pc:chgData name="Luiz Phelipe Utiama Sempreboni" userId="3f5f3216-6838-42b4-8f95-953f983fe7ed" providerId="ADAL" clId="{4F74A316-CE39-4334-8D64-99330089639C}" dt="2021-07-16T16:23:04.802" v="30"/>
+        <pc:sldMkLst>
+          <pc:docMk/>
+          <pc:sldMk cId="564867060" sldId="258"/>
+        </pc:sldMkLst>
+      </pc:sldChg>
+      <pc:sldChg chg="ord">
+        <pc:chgData name="Luiz Phelipe Utiama Sempreboni" userId="3f5f3216-6838-42b4-8f95-953f983fe7ed" providerId="ADAL" clId="{4F74A316-CE39-4334-8D64-99330089639C}" dt="2021-07-16T16:22:40.996" v="24"/>
+        <pc:sldMkLst>
+          <pc:docMk/>
+          <pc:sldMk cId="3015794695" sldId="260"/>
+        </pc:sldMkLst>
+      </pc:sldChg>
+      <pc:sldChg chg="ord">
+        <pc:chgData name="Luiz Phelipe Utiama Sempreboni" userId="3f5f3216-6838-42b4-8f95-953f983fe7ed" providerId="ADAL" clId="{4F74A316-CE39-4334-8D64-99330089639C}" dt="2021-07-16T16:23:01.587" v="28"/>
+        <pc:sldMkLst>
+          <pc:docMk/>
+          <pc:sldMk cId="1260666165" sldId="261"/>
+        </pc:sldMkLst>
+      </pc:sldChg>
+      <pc:sldChg chg="addSp delSp modSp add mod">
+        <pc:chgData name="Luiz Phelipe Utiama Sempreboni" userId="3f5f3216-6838-42b4-8f95-953f983fe7ed" providerId="ADAL" clId="{4F74A316-CE39-4334-8D64-99330089639C}" dt="2021-07-16T16:44:08.789" v="229" actId="1076"/>
+        <pc:sldMkLst>
+          <pc:docMk/>
+          <pc:sldMk cId="1251569096" sldId="267"/>
+        </pc:sldMkLst>
+        <pc:spChg chg="add del mod">
+          <ac:chgData name="Luiz Phelipe Utiama Sempreboni" userId="3f5f3216-6838-42b4-8f95-953f983fe7ed" providerId="ADAL" clId="{4F74A316-CE39-4334-8D64-99330089639C}" dt="2021-07-16T16:35:36.274" v="225" actId="14100"/>
+          <ac:spMkLst>
+            <pc:docMk/>
+            <pc:sldMk cId="1251569096" sldId="267"/>
+            <ac:spMk id="13" creationId="{17B81743-4CE9-4C89-8616-EBBEEA32D729}"/>
+          </ac:spMkLst>
+        </pc:spChg>
+        <pc:picChg chg="add del mod">
+          <ac:chgData name="Luiz Phelipe Utiama Sempreboni" userId="3f5f3216-6838-42b4-8f95-953f983fe7ed" providerId="ADAL" clId="{4F74A316-CE39-4334-8D64-99330089639C}" dt="2021-07-16T16:20:15.856" v="10" actId="478"/>
+          <ac:picMkLst>
+            <pc:docMk/>
+            <pc:sldMk cId="1251569096" sldId="267"/>
+            <ac:picMk id="3" creationId="{FC441E29-70B5-4542-857F-0AF3B2EB5DB0}"/>
+          </ac:picMkLst>
+        </pc:picChg>
+        <pc:picChg chg="add del mod">
+          <ac:chgData name="Luiz Phelipe Utiama Sempreboni" userId="3f5f3216-6838-42b4-8f95-953f983fe7ed" providerId="ADAL" clId="{4F74A316-CE39-4334-8D64-99330089639C}" dt="2021-07-16T16:20:21.886" v="16" actId="22"/>
+          <ac:picMkLst>
+            <pc:docMk/>
+            <pc:sldMk cId="1251569096" sldId="267"/>
+            <ac:picMk id="5" creationId="{8834BCAF-2305-46BF-B3E5-52B80C0A7BEF}"/>
+          </ac:picMkLst>
+        </pc:picChg>
+        <pc:picChg chg="add del mod">
+          <ac:chgData name="Luiz Phelipe Utiama Sempreboni" userId="3f5f3216-6838-42b4-8f95-953f983fe7ed" providerId="ADAL" clId="{4F74A316-CE39-4334-8D64-99330089639C}" dt="2021-07-16T16:27:47.063" v="37" actId="478"/>
+          <ac:picMkLst>
+            <pc:docMk/>
+            <pc:sldMk cId="1251569096" sldId="267"/>
+            <ac:picMk id="7" creationId="{04720A34-CA72-4E0F-A24C-86F3146A4BFE}"/>
+          </ac:picMkLst>
+        </pc:picChg>
+        <pc:picChg chg="del">
+          <ac:chgData name="Luiz Phelipe Utiama Sempreboni" userId="3f5f3216-6838-42b4-8f95-953f983fe7ed" providerId="ADAL" clId="{4F74A316-CE39-4334-8D64-99330089639C}" dt="2021-07-16T16:18:36.318" v="2" actId="478"/>
+          <ac:picMkLst>
+            <pc:docMk/>
+            <pc:sldMk cId="1251569096" sldId="267"/>
+            <ac:picMk id="9" creationId="{8BFCB35F-A634-4A4A-B6C4-D6C7B3A7CD69}"/>
+          </ac:picMkLst>
+        </pc:picChg>
+        <pc:picChg chg="add mod">
+          <ac:chgData name="Luiz Phelipe Utiama Sempreboni" userId="3f5f3216-6838-42b4-8f95-953f983fe7ed" providerId="ADAL" clId="{4F74A316-CE39-4334-8D64-99330089639C}" dt="2021-07-16T16:30:39.063" v="53" actId="1076"/>
+          <ac:picMkLst>
+            <pc:docMk/>
+            <pc:sldMk cId="1251569096" sldId="267"/>
+            <ac:picMk id="10" creationId="{69FAE0FA-69AF-41E1-A05B-A759E59A2425}"/>
+          </ac:picMkLst>
+        </pc:picChg>
+        <pc:picChg chg="add del mod">
+          <ac:chgData name="Luiz Phelipe Utiama Sempreboni" userId="3f5f3216-6838-42b4-8f95-953f983fe7ed" providerId="ADAL" clId="{4F74A316-CE39-4334-8D64-99330089639C}" dt="2021-07-16T16:43:47.356" v="227" actId="478"/>
+          <ac:picMkLst>
+            <pc:docMk/>
+            <pc:sldMk cId="1251569096" sldId="267"/>
+            <ac:picMk id="12" creationId="{E0FCBE5A-B2D3-457D-B5DD-36EC8AA26E8C}"/>
+          </ac:picMkLst>
+        </pc:picChg>
+        <pc:picChg chg="del">
+          <ac:chgData name="Luiz Phelipe Utiama Sempreboni" userId="3f5f3216-6838-42b4-8f95-953f983fe7ed" providerId="ADAL" clId="{4F74A316-CE39-4334-8D64-99330089639C}" dt="2021-07-16T16:18:31.004" v="1" actId="478"/>
+          <ac:picMkLst>
+            <pc:docMk/>
+            <pc:sldMk cId="1251569096" sldId="267"/>
+            <ac:picMk id="14" creationId="{7DDD8F81-E97F-4958-97E2-089C263E7A16}"/>
+          </ac:picMkLst>
+        </pc:picChg>
+        <pc:picChg chg="add del mod">
+          <ac:chgData name="Luiz Phelipe Utiama Sempreboni" userId="3f5f3216-6838-42b4-8f95-953f983fe7ed" providerId="ADAL" clId="{4F74A316-CE39-4334-8D64-99330089639C}" dt="2021-07-16T16:34:51.952" v="86" actId="22"/>
+          <ac:picMkLst>
+            <pc:docMk/>
+            <pc:sldMk cId="1251569096" sldId="267"/>
+            <ac:picMk id="16" creationId="{1957FE29-A7A8-4B27-A9DD-63479A709A4C}"/>
+          </ac:picMkLst>
+        </pc:picChg>
+        <pc:picChg chg="add mod">
+          <ac:chgData name="Luiz Phelipe Utiama Sempreboni" userId="3f5f3216-6838-42b4-8f95-953f983fe7ed" providerId="ADAL" clId="{4F74A316-CE39-4334-8D64-99330089639C}" dt="2021-07-16T16:44:08.789" v="229" actId="1076"/>
+          <ac:picMkLst>
+            <pc:docMk/>
+            <pc:sldMk cId="1251569096" sldId="267"/>
+            <ac:picMk id="18" creationId="{10A44309-CBBF-4387-B1B9-4EEE36168897}"/>
+          </ac:picMkLst>
+        </pc:picChg>
+      </pc:sldChg>
+    </pc:docChg>
+  </pc:docChgLst>
+</pc:chgInfo>
 </file>
 
 <file path=ppt/slideLayouts/slideLayout1.xml><?xml version="1.0" encoding="utf-8"?>
@@ -1529,7 +1699,7 @@
           <a:p>
             <a:fld id="{98961FCE-2ACA-4761-AE68-281F6F5FE818}" type="datetimeFigureOut">
               <a:rPr lang="pt-BR" smtClean="0"/>
-              <a:t>15/07/2021</a:t>
+              <a:t>16/07/2021</a:t>
             </a:fld>
             <a:endParaRPr lang="pt-BR"/>
           </a:p>
@@ -2988,7 +3158,7 @@
           <a:p>
             <a:fld id="{98961FCE-2ACA-4761-AE68-281F6F5FE818}" type="datetimeFigureOut">
               <a:rPr lang="pt-BR" smtClean="0"/>
-              <a:t>15/07/2021</a:t>
+              <a:t>16/07/2021</a:t>
             </a:fld>
             <a:endParaRPr lang="pt-BR"/>
           </a:p>
@@ -4441,7 +4611,7 @@
           <a:p>
             <a:fld id="{98961FCE-2ACA-4761-AE68-281F6F5FE818}" type="datetimeFigureOut">
               <a:rPr lang="pt-BR" smtClean="0"/>
-              <a:t>15/07/2021</a:t>
+              <a:t>16/07/2021</a:t>
             </a:fld>
             <a:endParaRPr lang="pt-BR"/>
           </a:p>
@@ -5896,7 +6066,7 @@
           <a:p>
             <a:fld id="{98961FCE-2ACA-4761-AE68-281F6F5FE818}" type="datetimeFigureOut">
               <a:rPr lang="pt-BR" smtClean="0"/>
-              <a:t>15/07/2021</a:t>
+              <a:t>16/07/2021</a:t>
             </a:fld>
             <a:endParaRPr lang="pt-BR"/>
           </a:p>
@@ -7404,7 +7574,7 @@
           <a:p>
             <a:fld id="{98961FCE-2ACA-4761-AE68-281F6F5FE818}" type="datetimeFigureOut">
               <a:rPr lang="pt-BR" smtClean="0"/>
-              <a:t>15/07/2021</a:t>
+              <a:t>16/07/2021</a:t>
             </a:fld>
             <a:endParaRPr lang="pt-BR"/>
           </a:p>
@@ -8925,7 +9095,7 @@
           <a:p>
             <a:fld id="{98961FCE-2ACA-4761-AE68-281F6F5FE818}" type="datetimeFigureOut">
               <a:rPr lang="pt-BR" smtClean="0"/>
-              <a:t>15/07/2021</a:t>
+              <a:t>16/07/2021</a:t>
             </a:fld>
             <a:endParaRPr lang="pt-BR"/>
           </a:p>
@@ -10590,7 +10760,7 @@
           <a:p>
             <a:fld id="{98961FCE-2ACA-4761-AE68-281F6F5FE818}" type="datetimeFigureOut">
               <a:rPr lang="pt-BR" smtClean="0"/>
-              <a:t>15/07/2021</a:t>
+              <a:t>16/07/2021</a:t>
             </a:fld>
             <a:endParaRPr lang="pt-BR"/>
           </a:p>
@@ -11988,7 +12158,7 @@
           <a:p>
             <a:fld id="{98961FCE-2ACA-4761-AE68-281F6F5FE818}" type="datetimeFigureOut">
               <a:rPr lang="pt-BR" smtClean="0"/>
-              <a:t>15/07/2021</a:t>
+              <a:t>16/07/2021</a:t>
             </a:fld>
             <a:endParaRPr lang="pt-BR"/>
           </a:p>
@@ -12088,7 +12258,7 @@
           <a:p>
             <a:fld id="{98961FCE-2ACA-4761-AE68-281F6F5FE818}" type="datetimeFigureOut">
               <a:rPr lang="pt-BR" smtClean="0"/>
-              <a:t>15/07/2021</a:t>
+              <a:t>16/07/2021</a:t>
             </a:fld>
             <a:endParaRPr lang="pt-BR"/>
           </a:p>
@@ -13614,7 +13784,7 @@
           <a:p>
             <a:fld id="{98961FCE-2ACA-4761-AE68-281F6F5FE818}" type="datetimeFigureOut">
               <a:rPr lang="pt-BR" smtClean="0"/>
-              <a:t>15/07/2021</a:t>
+              <a:t>16/07/2021</a:t>
             </a:fld>
             <a:endParaRPr lang="pt-BR"/>
           </a:p>
@@ -15150,7 +15320,7 @@
           <a:p>
             <a:fld id="{98961FCE-2ACA-4761-AE68-281F6F5FE818}" type="datetimeFigureOut">
               <a:rPr lang="pt-BR" smtClean="0"/>
-              <a:t>15/07/2021</a:t>
+              <a:t>16/07/2021</a:t>
             </a:fld>
             <a:endParaRPr lang="pt-BR"/>
           </a:p>
@@ -15373,7 +15543,7 @@
           <a:p>
             <a:fld id="{98961FCE-2ACA-4761-AE68-281F6F5FE818}" type="datetimeFigureOut">
               <a:rPr lang="pt-BR" smtClean="0"/>
-              <a:t>15/07/2021</a:t>
+              <a:t>16/07/2021</a:t>
             </a:fld>
             <a:endParaRPr lang="pt-BR"/>
           </a:p>
@@ -15951,638 +16121,7 @@
 </p:sld>
 </file>
 
-<file path=ppt/slides/slide2.xml><?xml version="1.0" encoding="utf-8"?>
-<p:sld xmlns:a="http://schemas.openxmlformats.org/drawingml/2006/main" xmlns:r="http://schemas.openxmlformats.org/officeDocument/2006/relationships" xmlns:p="http://schemas.openxmlformats.org/presentationml/2006/main">
-  <p:cSld>
-    <p:bg>
-      <p:bgPr>
-        <a:solidFill>
-          <a:schemeClr val="bg1"/>
-        </a:solidFill>
-        <a:effectLst/>
-      </p:bgPr>
-    </p:bg>
-    <p:spTree>
-      <p:nvGrpSpPr>
-        <p:cNvPr id="1" name=""/>
-        <p:cNvGrpSpPr/>
-        <p:nvPr/>
-      </p:nvGrpSpPr>
-      <p:grpSpPr>
-        <a:xfrm>
-          <a:off x="0" y="0"/>
-          <a:ext cx="0" cy="0"/>
-          <a:chOff x="0" y="0"/>
-          <a:chExt cx="0" cy="0"/>
-        </a:xfrm>
-      </p:grpSpPr>
-      <p:pic>
-        <p:nvPicPr>
-          <p:cNvPr id="9" name="Imagem 8">
-            <a:extLst>
-              <a:ext uri="{FF2B5EF4-FFF2-40B4-BE49-F238E27FC236}">
-                <a16:creationId xmlns:a16="http://schemas.microsoft.com/office/drawing/2014/main" id="{72CF7D43-EF37-43BC-9411-EF70B82136ED}"/>
-              </a:ext>
-            </a:extLst>
-          </p:cNvPr>
-          <p:cNvPicPr>
-            <a:picLocks noChangeAspect="1"/>
-          </p:cNvPicPr>
-          <p:nvPr/>
-        </p:nvPicPr>
-        <p:blipFill>
-          <a:blip r:embed="rId2"/>
-          <a:stretch>
-            <a:fillRect/>
-          </a:stretch>
-        </p:blipFill>
-        <p:spPr>
-          <a:xfrm>
-            <a:off x="180558" y="46015"/>
-            <a:ext cx="11922302" cy="6714483"/>
-          </a:xfrm>
-          <a:prstGeom prst="rect">
-            <a:avLst/>
-          </a:prstGeom>
-          <a:effectLst>
-            <a:outerShdw blurRad="50800" dist="38100" dir="2700000" algn="tl" rotWithShape="0">
-              <a:prstClr val="black">
-                <a:alpha val="40000"/>
-              </a:prstClr>
-            </a:outerShdw>
-          </a:effectLst>
-        </p:spPr>
-      </p:pic>
-    </p:spTree>
-    <p:extLst>
-      <p:ext uri="{BB962C8B-B14F-4D97-AF65-F5344CB8AC3E}">
-        <p14:creationId xmlns:p14="http://schemas.microsoft.com/office/powerpoint/2010/main" val="4204563038"/>
-      </p:ext>
-    </p:extLst>
-  </p:cSld>
-  <p:clrMapOvr>
-    <a:masterClrMapping/>
-  </p:clrMapOvr>
-  <mc:AlternateContent xmlns:mc="http://schemas.openxmlformats.org/markup-compatibility/2006" xmlns:p14="http://schemas.microsoft.com/office/powerpoint/2010/main">
-    <mc:Choice Requires="p14">
-      <p:transition p14:dur="10"/>
-    </mc:Choice>
-    <mc:Fallback xmlns="">
-      <p:transition/>
-    </mc:Fallback>
-  </mc:AlternateContent>
-</p:sld>
-</file>
-
-<file path=ppt/slides/slide3.xml><?xml version="1.0" encoding="utf-8"?>
-<p:sld xmlns:a="http://schemas.openxmlformats.org/drawingml/2006/main" xmlns:r="http://schemas.openxmlformats.org/officeDocument/2006/relationships" xmlns:p="http://schemas.openxmlformats.org/presentationml/2006/main">
-  <p:cSld>
-    <p:spTree>
-      <p:nvGrpSpPr>
-        <p:cNvPr id="1" name=""/>
-        <p:cNvGrpSpPr/>
-        <p:nvPr/>
-      </p:nvGrpSpPr>
-      <p:grpSpPr>
-        <a:xfrm>
-          <a:off x="0" y="0"/>
-          <a:ext cx="0" cy="0"/>
-          <a:chOff x="0" y="0"/>
-          <a:chExt cx="0" cy="0"/>
-        </a:xfrm>
-      </p:grpSpPr>
-      <p:pic>
-        <p:nvPicPr>
-          <p:cNvPr id="7" name="Imagem 6">
-            <a:extLst>
-              <a:ext uri="{FF2B5EF4-FFF2-40B4-BE49-F238E27FC236}">
-                <a16:creationId xmlns:a16="http://schemas.microsoft.com/office/drawing/2014/main" id="{8C4F87E0-E62C-4050-97B2-A6E7EA58476E}"/>
-              </a:ext>
-            </a:extLst>
-          </p:cNvPr>
-          <p:cNvPicPr>
-            <a:picLocks noChangeAspect="1"/>
-          </p:cNvPicPr>
-          <p:nvPr/>
-        </p:nvPicPr>
-        <p:blipFill>
-          <a:blip r:embed="rId2"/>
-          <a:stretch>
-            <a:fillRect/>
-          </a:stretch>
-        </p:blipFill>
-        <p:spPr>
-          <a:xfrm>
-            <a:off x="161026" y="90578"/>
-            <a:ext cx="11869947" cy="6676844"/>
-          </a:xfrm>
-          <a:prstGeom prst="rect">
-            <a:avLst/>
-          </a:prstGeom>
-          <a:ln>
-            <a:solidFill>
-              <a:schemeClr val="bg1">
-                <a:lumMod val="65000"/>
-              </a:schemeClr>
-            </a:solidFill>
-          </a:ln>
-          <a:effectLst>
-            <a:outerShdw blurRad="50800" dist="38100" dir="5400000" algn="t" rotWithShape="0">
-              <a:prstClr val="black">
-                <a:alpha val="40000"/>
-              </a:prstClr>
-            </a:outerShdw>
-          </a:effectLst>
-        </p:spPr>
-      </p:pic>
-    </p:spTree>
-    <p:extLst>
-      <p:ext uri="{BB962C8B-B14F-4D97-AF65-F5344CB8AC3E}">
-        <p14:creationId xmlns:p14="http://schemas.microsoft.com/office/powerpoint/2010/main" val="3178167831"/>
-      </p:ext>
-    </p:extLst>
-  </p:cSld>
-  <p:clrMapOvr>
-    <a:masterClrMapping/>
-  </p:clrMapOvr>
-  <mc:AlternateContent xmlns:mc="http://schemas.openxmlformats.org/markup-compatibility/2006" xmlns:p14="http://schemas.microsoft.com/office/powerpoint/2010/main">
-    <mc:Choice Requires="p14">
-      <p:transition p14:dur="10"/>
-    </mc:Choice>
-    <mc:Fallback xmlns="">
-      <p:transition/>
-    </mc:Fallback>
-  </mc:AlternateContent>
-</p:sld>
-</file>
-
-<file path=ppt/slides/slide4.xml><?xml version="1.0" encoding="utf-8"?>
-<p:sld xmlns:a="http://schemas.openxmlformats.org/drawingml/2006/main" xmlns:r="http://schemas.openxmlformats.org/officeDocument/2006/relationships" xmlns:p="http://schemas.openxmlformats.org/presentationml/2006/main">
-  <p:cSld>
-    <p:bg>
-      <p:bgPr>
-        <a:solidFill>
-          <a:schemeClr val="bg1"/>
-        </a:solidFill>
-        <a:effectLst/>
-      </p:bgPr>
-    </p:bg>
-    <p:spTree>
-      <p:nvGrpSpPr>
-        <p:cNvPr id="1" name=""/>
-        <p:cNvGrpSpPr/>
-        <p:nvPr/>
-      </p:nvGrpSpPr>
-      <p:grpSpPr>
-        <a:xfrm>
-          <a:off x="0" y="0"/>
-          <a:ext cx="0" cy="0"/>
-          <a:chOff x="0" y="0"/>
-          <a:chExt cx="0" cy="0"/>
-        </a:xfrm>
-      </p:grpSpPr>
-      <p:pic>
-        <p:nvPicPr>
-          <p:cNvPr id="5" name="Imagem 4" descr="Tabela&#10;&#10;Descrição gerada automaticamente">
-            <a:extLst>
-              <a:ext uri="{FF2B5EF4-FFF2-40B4-BE49-F238E27FC236}">
-                <a16:creationId xmlns:a16="http://schemas.microsoft.com/office/drawing/2014/main" id="{32216C0A-BFD9-4332-8673-6EA41AC3C983}"/>
-              </a:ext>
-            </a:extLst>
-          </p:cNvPr>
-          <p:cNvPicPr>
-            <a:picLocks noChangeAspect="1"/>
-          </p:cNvPicPr>
-          <p:nvPr/>
-        </p:nvPicPr>
-        <p:blipFill>
-          <a:blip r:embed="rId2"/>
-          <a:stretch>
-            <a:fillRect/>
-          </a:stretch>
-        </p:blipFill>
-        <p:spPr>
-          <a:xfrm>
-            <a:off x="152400" y="85725"/>
-            <a:ext cx="11887200" cy="6686549"/>
-          </a:xfrm>
-          <a:prstGeom prst="rect">
-            <a:avLst/>
-          </a:prstGeom>
-          <a:effectLst>
-            <a:outerShdw blurRad="50800" dist="38100" dir="2700000" algn="tl" rotWithShape="0">
-              <a:prstClr val="black">
-                <a:alpha val="40000"/>
-              </a:prstClr>
-            </a:outerShdw>
-          </a:effectLst>
-        </p:spPr>
-      </p:pic>
-    </p:spTree>
-    <p:extLst>
-      <p:ext uri="{BB962C8B-B14F-4D97-AF65-F5344CB8AC3E}">
-        <p14:creationId xmlns:p14="http://schemas.microsoft.com/office/powerpoint/2010/main" val="3328689743"/>
-      </p:ext>
-    </p:extLst>
-  </p:cSld>
-  <p:clrMapOvr>
-    <a:masterClrMapping/>
-  </p:clrMapOvr>
-  <mc:AlternateContent xmlns:mc="http://schemas.openxmlformats.org/markup-compatibility/2006" xmlns:p14="http://schemas.microsoft.com/office/powerpoint/2010/main">
-    <mc:Choice Requires="p14">
-      <p:transition p14:dur="10"/>
-    </mc:Choice>
-    <mc:Fallback xmlns="">
-      <p:transition/>
-    </mc:Fallback>
-  </mc:AlternateContent>
-</p:sld>
-</file>
-
-<file path=ppt/slides/slide5.xml><?xml version="1.0" encoding="utf-8"?>
-<p:sld xmlns:a="http://schemas.openxmlformats.org/drawingml/2006/main" xmlns:r="http://schemas.openxmlformats.org/officeDocument/2006/relationships" xmlns:p="http://schemas.openxmlformats.org/presentationml/2006/main">
-  <p:cSld>
-    <p:spTree>
-      <p:nvGrpSpPr>
-        <p:cNvPr id="1" name=""/>
-        <p:cNvGrpSpPr/>
-        <p:nvPr/>
-      </p:nvGrpSpPr>
-      <p:grpSpPr>
-        <a:xfrm>
-          <a:off x="0" y="0"/>
-          <a:ext cx="0" cy="0"/>
-          <a:chOff x="0" y="0"/>
-          <a:chExt cx="0" cy="0"/>
-        </a:xfrm>
-      </p:grpSpPr>
-      <p:pic>
-        <p:nvPicPr>
-          <p:cNvPr id="8" name="Imagem 7">
-            <a:extLst>
-              <a:ext uri="{FF2B5EF4-FFF2-40B4-BE49-F238E27FC236}">
-                <a16:creationId xmlns:a16="http://schemas.microsoft.com/office/drawing/2014/main" id="{E799B531-5FE0-4103-98A1-276646CDA750}"/>
-              </a:ext>
-            </a:extLst>
-          </p:cNvPr>
-          <p:cNvPicPr>
-            <a:picLocks noChangeAspect="1"/>
-          </p:cNvPicPr>
-          <p:nvPr/>
-        </p:nvPicPr>
-        <p:blipFill>
-          <a:blip r:embed="rId2"/>
-          <a:stretch>
-            <a:fillRect/>
-          </a:stretch>
-        </p:blipFill>
-        <p:spPr>
-          <a:xfrm>
-            <a:off x="24886" y="422694"/>
-            <a:ext cx="12142228" cy="6435306"/>
-          </a:xfrm>
-          <a:prstGeom prst="rect">
-            <a:avLst/>
-          </a:prstGeom>
-          <a:effectLst>
-            <a:outerShdw blurRad="50800" dist="38100" dir="2700000" algn="tl" rotWithShape="0">
-              <a:prstClr val="black">
-                <a:alpha val="40000"/>
-              </a:prstClr>
-            </a:outerShdw>
-          </a:effectLst>
-        </p:spPr>
-      </p:pic>
-      <p:pic>
-        <p:nvPicPr>
-          <p:cNvPr id="10" name="Imagem 9">
-            <a:extLst>
-              <a:ext uri="{FF2B5EF4-FFF2-40B4-BE49-F238E27FC236}">
-                <a16:creationId xmlns:a16="http://schemas.microsoft.com/office/drawing/2014/main" id="{8E857049-EC2C-4166-A6A3-505BAFCA68A8}"/>
-              </a:ext>
-            </a:extLst>
-          </p:cNvPr>
-          <p:cNvPicPr>
-            <a:picLocks noChangeAspect="1"/>
-          </p:cNvPicPr>
-          <p:nvPr/>
-        </p:nvPicPr>
-        <p:blipFill>
-          <a:blip r:embed="rId3"/>
-          <a:stretch>
-            <a:fillRect/>
-          </a:stretch>
-        </p:blipFill>
-        <p:spPr>
-          <a:xfrm>
-            <a:off x="-24885" y="0"/>
-            <a:ext cx="12216885" cy="422694"/>
-          </a:xfrm>
-          <a:prstGeom prst="rect">
-            <a:avLst/>
-          </a:prstGeom>
-        </p:spPr>
-      </p:pic>
-    </p:spTree>
-    <p:extLst>
-      <p:ext uri="{BB962C8B-B14F-4D97-AF65-F5344CB8AC3E}">
-        <p14:creationId xmlns:p14="http://schemas.microsoft.com/office/powerpoint/2010/main" val="1260666165"/>
-      </p:ext>
-    </p:extLst>
-  </p:cSld>
-  <p:clrMapOvr>
-    <a:masterClrMapping/>
-  </p:clrMapOvr>
-  <mc:AlternateContent xmlns:mc="http://schemas.openxmlformats.org/markup-compatibility/2006" xmlns:p14="http://schemas.microsoft.com/office/powerpoint/2010/main">
-    <mc:Choice Requires="p14">
-      <p:transition p14:dur="10"/>
-    </mc:Choice>
-    <mc:Fallback xmlns="">
-      <p:transition/>
-    </mc:Fallback>
-  </mc:AlternateContent>
-</p:sld>
-</file>
-
-<file path=ppt/slides/slide6.xml><?xml version="1.0" encoding="utf-8"?>
-<p:sld xmlns:a="http://schemas.openxmlformats.org/drawingml/2006/main" xmlns:r="http://schemas.openxmlformats.org/officeDocument/2006/relationships" xmlns:p="http://schemas.openxmlformats.org/presentationml/2006/main">
-  <p:cSld>
-    <p:spTree>
-      <p:nvGrpSpPr>
-        <p:cNvPr id="1" name=""/>
-        <p:cNvGrpSpPr/>
-        <p:nvPr/>
-      </p:nvGrpSpPr>
-      <p:grpSpPr>
-        <a:xfrm>
-          <a:off x="0" y="0"/>
-          <a:ext cx="0" cy="0"/>
-          <a:chOff x="0" y="0"/>
-          <a:chExt cx="0" cy="0"/>
-        </a:xfrm>
-      </p:grpSpPr>
-      <p:pic>
-        <p:nvPicPr>
-          <p:cNvPr id="13" name="Imagem 12">
-            <a:extLst>
-              <a:ext uri="{FF2B5EF4-FFF2-40B4-BE49-F238E27FC236}">
-                <a16:creationId xmlns:a16="http://schemas.microsoft.com/office/drawing/2014/main" id="{E0203AA7-AD6C-46F7-B2EF-C74C5F8D0B49}"/>
-              </a:ext>
-            </a:extLst>
-          </p:cNvPr>
-          <p:cNvPicPr>
-            <a:picLocks noChangeAspect="1"/>
-          </p:cNvPicPr>
-          <p:nvPr/>
-        </p:nvPicPr>
-        <p:blipFill>
-          <a:blip r:embed="rId2"/>
-          <a:stretch>
-            <a:fillRect/>
-          </a:stretch>
-        </p:blipFill>
-        <p:spPr>
-          <a:xfrm>
-            <a:off x="359434" y="445331"/>
-            <a:ext cx="11473132" cy="6361271"/>
-          </a:xfrm>
-          <a:prstGeom prst="rect">
-            <a:avLst/>
-          </a:prstGeom>
-          <a:effectLst>
-            <a:outerShdw blurRad="50800" dist="38100" dir="2700000" algn="tl" rotWithShape="0">
-              <a:prstClr val="black">
-                <a:alpha val="40000"/>
-              </a:prstClr>
-            </a:outerShdw>
-          </a:effectLst>
-        </p:spPr>
-      </p:pic>
-      <p:pic>
-        <p:nvPicPr>
-          <p:cNvPr id="15" name="Imagem 14">
-            <a:extLst>
-              <a:ext uri="{FF2B5EF4-FFF2-40B4-BE49-F238E27FC236}">
-                <a16:creationId xmlns:a16="http://schemas.microsoft.com/office/drawing/2014/main" id="{C29AA3FC-7D5F-47B0-B711-5622438461CE}"/>
-              </a:ext>
-            </a:extLst>
-          </p:cNvPr>
-          <p:cNvPicPr>
-            <a:picLocks noChangeAspect="1"/>
-          </p:cNvPicPr>
-          <p:nvPr/>
-        </p:nvPicPr>
-        <p:blipFill>
-          <a:blip r:embed="rId3"/>
-          <a:stretch>
-            <a:fillRect/>
-          </a:stretch>
-        </p:blipFill>
-        <p:spPr>
-          <a:xfrm>
-            <a:off x="-1" y="0"/>
-            <a:ext cx="12192000" cy="445331"/>
-          </a:xfrm>
-          <a:prstGeom prst="rect">
-            <a:avLst/>
-          </a:prstGeom>
-        </p:spPr>
-      </p:pic>
-    </p:spTree>
-    <p:extLst>
-      <p:ext uri="{BB962C8B-B14F-4D97-AF65-F5344CB8AC3E}">
-        <p14:creationId xmlns:p14="http://schemas.microsoft.com/office/powerpoint/2010/main" val="564867060"/>
-      </p:ext>
-    </p:extLst>
-  </p:cSld>
-  <p:clrMapOvr>
-    <a:masterClrMapping/>
-  </p:clrMapOvr>
-  <mc:AlternateContent xmlns:mc="http://schemas.openxmlformats.org/markup-compatibility/2006" xmlns:p14="http://schemas.microsoft.com/office/powerpoint/2010/main">
-    <mc:Choice Requires="p14">
-      <p:transition p14:dur="10"/>
-    </mc:Choice>
-    <mc:Fallback xmlns="">
-      <p:transition/>
-    </mc:Fallback>
-  </mc:AlternateContent>
-</p:sld>
-</file>
-
-<file path=ppt/slides/slide7.xml><?xml version="1.0" encoding="utf-8"?>
-<p:sld xmlns:a="http://schemas.openxmlformats.org/drawingml/2006/main" xmlns:r="http://schemas.openxmlformats.org/officeDocument/2006/relationships" xmlns:p="http://schemas.openxmlformats.org/presentationml/2006/main">
-  <p:cSld>
-    <p:spTree>
-      <p:nvGrpSpPr>
-        <p:cNvPr id="1" name=""/>
-        <p:cNvGrpSpPr/>
-        <p:nvPr/>
-      </p:nvGrpSpPr>
-      <p:grpSpPr>
-        <a:xfrm>
-          <a:off x="0" y="0"/>
-          <a:ext cx="0" cy="0"/>
-          <a:chOff x="0" y="0"/>
-          <a:chExt cx="0" cy="0"/>
-        </a:xfrm>
-      </p:grpSpPr>
-      <p:pic>
-        <p:nvPicPr>
-          <p:cNvPr id="9" name="Imagem 8">
-            <a:extLst>
-              <a:ext uri="{FF2B5EF4-FFF2-40B4-BE49-F238E27FC236}">
-                <a16:creationId xmlns:a16="http://schemas.microsoft.com/office/drawing/2014/main" id="{8BFCB35F-A634-4A4A-B6C4-D6C7B3A7CD69}"/>
-              </a:ext>
-            </a:extLst>
-          </p:cNvPr>
-          <p:cNvPicPr>
-            <a:picLocks noChangeAspect="1"/>
-          </p:cNvPicPr>
-          <p:nvPr/>
-        </p:nvPicPr>
-        <p:blipFill>
-          <a:blip r:embed="rId2"/>
-          <a:stretch>
-            <a:fillRect/>
-          </a:stretch>
-        </p:blipFill>
-        <p:spPr>
-          <a:xfrm>
-            <a:off x="-1" y="170361"/>
-            <a:ext cx="12135525" cy="461063"/>
-          </a:xfrm>
-          <a:prstGeom prst="rect">
-            <a:avLst/>
-          </a:prstGeom>
-          <a:effectLst/>
-        </p:spPr>
-      </p:pic>
-      <p:pic>
-        <p:nvPicPr>
-          <p:cNvPr id="14" name="Imagem 13">
-            <a:extLst>
-              <a:ext uri="{FF2B5EF4-FFF2-40B4-BE49-F238E27FC236}">
-                <a16:creationId xmlns:a16="http://schemas.microsoft.com/office/drawing/2014/main" id="{7DDD8F81-E97F-4958-97E2-089C263E7A16}"/>
-              </a:ext>
-            </a:extLst>
-          </p:cNvPr>
-          <p:cNvPicPr>
-            <a:picLocks noChangeAspect="1"/>
-          </p:cNvPicPr>
-          <p:nvPr/>
-        </p:nvPicPr>
-        <p:blipFill>
-          <a:blip r:embed="rId3"/>
-          <a:stretch>
-            <a:fillRect/>
-          </a:stretch>
-        </p:blipFill>
-        <p:spPr>
-          <a:xfrm>
-            <a:off x="33597" y="802256"/>
-            <a:ext cx="12124806" cy="5963020"/>
-          </a:xfrm>
-          <a:prstGeom prst="rect">
-            <a:avLst/>
-          </a:prstGeom>
-          <a:effectLst>
-            <a:outerShdw blurRad="50800" dist="38100" dir="2700000" algn="tl" rotWithShape="0">
-              <a:prstClr val="black">
-                <a:alpha val="40000"/>
-              </a:prstClr>
-            </a:outerShdw>
-          </a:effectLst>
-        </p:spPr>
-      </p:pic>
-    </p:spTree>
-    <p:extLst>
-      <p:ext uri="{BB962C8B-B14F-4D97-AF65-F5344CB8AC3E}">
-        <p14:creationId xmlns:p14="http://schemas.microsoft.com/office/powerpoint/2010/main" val="3015794695"/>
-      </p:ext>
-    </p:extLst>
-  </p:cSld>
-  <p:clrMapOvr>
-    <a:masterClrMapping/>
-  </p:clrMapOvr>
-</p:sld>
-</file>
-
-<file path=ppt/slides/slide8.xml><?xml version="1.0" encoding="utf-8"?>
-<p:sld xmlns:a="http://schemas.openxmlformats.org/drawingml/2006/main" xmlns:r="http://schemas.openxmlformats.org/officeDocument/2006/relationships" xmlns:p="http://schemas.openxmlformats.org/presentationml/2006/main">
-  <p:cSld>
-    <p:spTree>
-      <p:nvGrpSpPr>
-        <p:cNvPr id="1" name=""/>
-        <p:cNvGrpSpPr/>
-        <p:nvPr/>
-      </p:nvGrpSpPr>
-      <p:grpSpPr>
-        <a:xfrm>
-          <a:off x="0" y="0"/>
-          <a:ext cx="0" cy="0"/>
-          <a:chOff x="0" y="0"/>
-          <a:chExt cx="0" cy="0"/>
-        </a:xfrm>
-      </p:grpSpPr>
-      <p:pic>
-        <p:nvPicPr>
-          <p:cNvPr id="7" name="Imagem 6">
-            <a:extLst>
-              <a:ext uri="{FF2B5EF4-FFF2-40B4-BE49-F238E27FC236}">
-                <a16:creationId xmlns:a16="http://schemas.microsoft.com/office/drawing/2014/main" id="{9C07296C-F9AF-4722-89A1-0775CF6C57A4}"/>
-              </a:ext>
-            </a:extLst>
-          </p:cNvPr>
-          <p:cNvPicPr>
-            <a:picLocks noChangeAspect="1"/>
-          </p:cNvPicPr>
-          <p:nvPr/>
-        </p:nvPicPr>
-        <p:blipFill>
-          <a:blip r:embed="rId2"/>
-          <a:stretch>
-            <a:fillRect/>
-          </a:stretch>
-        </p:blipFill>
-        <p:spPr>
-          <a:xfrm>
-            <a:off x="177267" y="99204"/>
-            <a:ext cx="11837466" cy="6659592"/>
-          </a:xfrm>
-          <a:prstGeom prst="rect">
-            <a:avLst/>
-          </a:prstGeom>
-          <a:effectLst>
-            <a:outerShdw blurRad="50800" dist="38100" dir="2700000" algn="tl" rotWithShape="0">
-              <a:prstClr val="black">
-                <a:alpha val="40000"/>
-              </a:prstClr>
-            </a:outerShdw>
-          </a:effectLst>
-        </p:spPr>
-      </p:pic>
-    </p:spTree>
-    <p:extLst>
-      <p:ext uri="{BB962C8B-B14F-4D97-AF65-F5344CB8AC3E}">
-        <p14:creationId xmlns:p14="http://schemas.microsoft.com/office/powerpoint/2010/main" val="4093100218"/>
-      </p:ext>
-    </p:extLst>
-  </p:cSld>
-  <p:clrMapOvr>
-    <a:masterClrMapping/>
-  </p:clrMapOvr>
-  <mc:AlternateContent xmlns:mc="http://schemas.openxmlformats.org/markup-compatibility/2006" xmlns:p14="http://schemas.microsoft.com/office/powerpoint/2010/main">
-    <mc:Choice Requires="p14">
-      <p:transition p14:dur="10"/>
-    </mc:Choice>
-    <mc:Fallback xmlns="">
-      <p:transition/>
-    </mc:Fallback>
-  </mc:AlternateContent>
-</p:sld>
-</file>
-
-<file path=ppt/slides/slide9.xml><?xml version="1.0" encoding="utf-8"?>
+<file path=ppt/slides/slide10.xml><?xml version="1.0" encoding="utf-8"?>
 <p:sld xmlns:a="http://schemas.openxmlformats.org/drawingml/2006/main" xmlns:r="http://schemas.openxmlformats.org/officeDocument/2006/relationships" xmlns:p="http://schemas.openxmlformats.org/presentationml/2006/main">
   <p:cSld>
     <p:bg>
@@ -17306,6 +16845,801 @@
   <p:clrMapOvr>
     <a:masterClrMapping/>
   </p:clrMapOvr>
+</p:sld>
+</file>
+
+<file path=ppt/slides/slide2.xml><?xml version="1.0" encoding="utf-8"?>
+<p:sld xmlns:a="http://schemas.openxmlformats.org/drawingml/2006/main" xmlns:r="http://schemas.openxmlformats.org/officeDocument/2006/relationships" xmlns:p="http://schemas.openxmlformats.org/presentationml/2006/main">
+  <p:cSld>
+    <p:bg>
+      <p:bgPr>
+        <a:solidFill>
+          <a:schemeClr val="bg1"/>
+        </a:solidFill>
+        <a:effectLst/>
+      </p:bgPr>
+    </p:bg>
+    <p:spTree>
+      <p:nvGrpSpPr>
+        <p:cNvPr id="1" name=""/>
+        <p:cNvGrpSpPr/>
+        <p:nvPr/>
+      </p:nvGrpSpPr>
+      <p:grpSpPr>
+        <a:xfrm>
+          <a:off x="0" y="0"/>
+          <a:ext cx="0" cy="0"/>
+          <a:chOff x="0" y="0"/>
+          <a:chExt cx="0" cy="0"/>
+        </a:xfrm>
+      </p:grpSpPr>
+      <p:pic>
+        <p:nvPicPr>
+          <p:cNvPr id="5" name="Imagem 4">
+            <a:extLst>
+              <a:ext uri="{FF2B5EF4-FFF2-40B4-BE49-F238E27FC236}">
+                <a16:creationId xmlns:a16="http://schemas.microsoft.com/office/drawing/2014/main" id="{0C417362-9A6B-4378-9C14-5C1C8D00EBA8}"/>
+              </a:ext>
+            </a:extLst>
+          </p:cNvPr>
+          <p:cNvPicPr>
+            <a:picLocks noChangeAspect="1"/>
+          </p:cNvPicPr>
+          <p:nvPr/>
+        </p:nvPicPr>
+        <p:blipFill>
+          <a:blip r:embed="rId2"/>
+          <a:stretch>
+            <a:fillRect/>
+          </a:stretch>
+        </p:blipFill>
+        <p:spPr>
+          <a:xfrm>
+            <a:off x="0" y="0"/>
+            <a:ext cx="12192000" cy="578177"/>
+          </a:xfrm>
+          <a:prstGeom prst="rect">
+            <a:avLst/>
+          </a:prstGeom>
+        </p:spPr>
+      </p:pic>
+      <p:pic>
+        <p:nvPicPr>
+          <p:cNvPr id="7" name="Imagem 6">
+            <a:extLst>
+              <a:ext uri="{FF2B5EF4-FFF2-40B4-BE49-F238E27FC236}">
+                <a16:creationId xmlns:a16="http://schemas.microsoft.com/office/drawing/2014/main" id="{5592873E-418D-44A9-B648-DD6D1EEBCF56}"/>
+              </a:ext>
+            </a:extLst>
+          </p:cNvPr>
+          <p:cNvPicPr>
+            <a:picLocks noChangeAspect="1"/>
+          </p:cNvPicPr>
+          <p:nvPr/>
+        </p:nvPicPr>
+        <p:blipFill>
+          <a:blip r:embed="rId3"/>
+          <a:stretch>
+            <a:fillRect/>
+          </a:stretch>
+        </p:blipFill>
+        <p:spPr>
+          <a:xfrm>
+            <a:off x="639546" y="578177"/>
+            <a:ext cx="10912907" cy="6214170"/>
+          </a:xfrm>
+          <a:prstGeom prst="rect">
+            <a:avLst/>
+          </a:prstGeom>
+          <a:effectLst>
+            <a:outerShdw blurRad="50800" dist="38100" dir="2700000" algn="tl" rotWithShape="0">
+              <a:prstClr val="black">
+                <a:alpha val="40000"/>
+              </a:prstClr>
+            </a:outerShdw>
+          </a:effectLst>
+        </p:spPr>
+      </p:pic>
+    </p:spTree>
+    <p:extLst>
+      <p:ext uri="{BB962C8B-B14F-4D97-AF65-F5344CB8AC3E}">
+        <p14:creationId xmlns:p14="http://schemas.microsoft.com/office/powerpoint/2010/main" val="4204563038"/>
+      </p:ext>
+    </p:extLst>
+  </p:cSld>
+  <p:clrMapOvr>
+    <a:masterClrMapping/>
+  </p:clrMapOvr>
+  <mc:AlternateContent xmlns:mc="http://schemas.openxmlformats.org/markup-compatibility/2006" xmlns:p14="http://schemas.microsoft.com/office/powerpoint/2010/main">
+    <mc:Choice Requires="p14">
+      <p:transition p14:dur="10"/>
+    </mc:Choice>
+    <mc:Fallback xmlns="">
+      <p:transition/>
+    </mc:Fallback>
+  </mc:AlternateContent>
+</p:sld>
+</file>
+
+<file path=ppt/slides/slide3.xml><?xml version="1.0" encoding="utf-8"?>
+<p:sld xmlns:a="http://schemas.openxmlformats.org/drawingml/2006/main" xmlns:r="http://schemas.openxmlformats.org/officeDocument/2006/relationships" xmlns:p="http://schemas.openxmlformats.org/presentationml/2006/main">
+  <p:cSld>
+    <p:spTree>
+      <p:nvGrpSpPr>
+        <p:cNvPr id="1" name=""/>
+        <p:cNvGrpSpPr/>
+        <p:nvPr/>
+      </p:nvGrpSpPr>
+      <p:grpSpPr>
+        <a:xfrm>
+          <a:off x="0" y="0"/>
+          <a:ext cx="0" cy="0"/>
+          <a:chOff x="0" y="0"/>
+          <a:chExt cx="0" cy="0"/>
+        </a:xfrm>
+      </p:grpSpPr>
+      <p:pic>
+        <p:nvPicPr>
+          <p:cNvPr id="7" name="Imagem 6">
+            <a:extLst>
+              <a:ext uri="{FF2B5EF4-FFF2-40B4-BE49-F238E27FC236}">
+                <a16:creationId xmlns:a16="http://schemas.microsoft.com/office/drawing/2014/main" id="{8C4F87E0-E62C-4050-97B2-A6E7EA58476E}"/>
+              </a:ext>
+            </a:extLst>
+          </p:cNvPr>
+          <p:cNvPicPr>
+            <a:picLocks noChangeAspect="1"/>
+          </p:cNvPicPr>
+          <p:nvPr/>
+        </p:nvPicPr>
+        <p:blipFill>
+          <a:blip r:embed="rId2"/>
+          <a:stretch>
+            <a:fillRect/>
+          </a:stretch>
+        </p:blipFill>
+        <p:spPr>
+          <a:xfrm>
+            <a:off x="161026" y="90578"/>
+            <a:ext cx="11869947" cy="6676844"/>
+          </a:xfrm>
+          <a:prstGeom prst="rect">
+            <a:avLst/>
+          </a:prstGeom>
+          <a:ln>
+            <a:solidFill>
+              <a:schemeClr val="bg1">
+                <a:lumMod val="65000"/>
+              </a:schemeClr>
+            </a:solidFill>
+          </a:ln>
+          <a:effectLst>
+            <a:outerShdw blurRad="50800" dist="38100" dir="5400000" algn="t" rotWithShape="0">
+              <a:prstClr val="black">
+                <a:alpha val="40000"/>
+              </a:prstClr>
+            </a:outerShdw>
+          </a:effectLst>
+        </p:spPr>
+      </p:pic>
+    </p:spTree>
+    <p:extLst>
+      <p:ext uri="{BB962C8B-B14F-4D97-AF65-F5344CB8AC3E}">
+        <p14:creationId xmlns:p14="http://schemas.microsoft.com/office/powerpoint/2010/main" val="3178167831"/>
+      </p:ext>
+    </p:extLst>
+  </p:cSld>
+  <p:clrMapOvr>
+    <a:masterClrMapping/>
+  </p:clrMapOvr>
+  <mc:AlternateContent xmlns:mc="http://schemas.openxmlformats.org/markup-compatibility/2006" xmlns:p14="http://schemas.microsoft.com/office/powerpoint/2010/main">
+    <mc:Choice Requires="p14">
+      <p:transition p14:dur="10"/>
+    </mc:Choice>
+    <mc:Fallback xmlns="">
+      <p:transition/>
+    </mc:Fallback>
+  </mc:AlternateContent>
+</p:sld>
+</file>
+
+<file path=ppt/slides/slide4.xml><?xml version="1.0" encoding="utf-8"?>
+<p:sld xmlns:a="http://schemas.openxmlformats.org/drawingml/2006/main" xmlns:r="http://schemas.openxmlformats.org/officeDocument/2006/relationships" xmlns:p="http://schemas.openxmlformats.org/presentationml/2006/main">
+  <p:cSld>
+    <p:spTree>
+      <p:nvGrpSpPr>
+        <p:cNvPr id="1" name=""/>
+        <p:cNvGrpSpPr/>
+        <p:nvPr/>
+      </p:nvGrpSpPr>
+      <p:grpSpPr>
+        <a:xfrm>
+          <a:off x="0" y="0"/>
+          <a:ext cx="0" cy="0"/>
+          <a:chOff x="0" y="0"/>
+          <a:chExt cx="0" cy="0"/>
+        </a:xfrm>
+      </p:grpSpPr>
+      <p:pic>
+        <p:nvPicPr>
+          <p:cNvPr id="8" name="Imagem 7">
+            <a:extLst>
+              <a:ext uri="{FF2B5EF4-FFF2-40B4-BE49-F238E27FC236}">
+                <a16:creationId xmlns:a16="http://schemas.microsoft.com/office/drawing/2014/main" id="{E799B531-5FE0-4103-98A1-276646CDA750}"/>
+              </a:ext>
+            </a:extLst>
+          </p:cNvPr>
+          <p:cNvPicPr>
+            <a:picLocks noChangeAspect="1"/>
+          </p:cNvPicPr>
+          <p:nvPr/>
+        </p:nvPicPr>
+        <p:blipFill>
+          <a:blip r:embed="rId2"/>
+          <a:stretch>
+            <a:fillRect/>
+          </a:stretch>
+        </p:blipFill>
+        <p:spPr>
+          <a:xfrm>
+            <a:off x="24886" y="422694"/>
+            <a:ext cx="12142228" cy="6435306"/>
+          </a:xfrm>
+          <a:prstGeom prst="rect">
+            <a:avLst/>
+          </a:prstGeom>
+          <a:effectLst>
+            <a:outerShdw blurRad="50800" dist="38100" dir="2700000" algn="tl" rotWithShape="0">
+              <a:prstClr val="black">
+                <a:alpha val="40000"/>
+              </a:prstClr>
+            </a:outerShdw>
+          </a:effectLst>
+        </p:spPr>
+      </p:pic>
+      <p:pic>
+        <p:nvPicPr>
+          <p:cNvPr id="10" name="Imagem 9">
+            <a:extLst>
+              <a:ext uri="{FF2B5EF4-FFF2-40B4-BE49-F238E27FC236}">
+                <a16:creationId xmlns:a16="http://schemas.microsoft.com/office/drawing/2014/main" id="{8E857049-EC2C-4166-A6A3-505BAFCA68A8}"/>
+              </a:ext>
+            </a:extLst>
+          </p:cNvPr>
+          <p:cNvPicPr>
+            <a:picLocks noChangeAspect="1"/>
+          </p:cNvPicPr>
+          <p:nvPr/>
+        </p:nvPicPr>
+        <p:blipFill>
+          <a:blip r:embed="rId3"/>
+          <a:stretch>
+            <a:fillRect/>
+          </a:stretch>
+        </p:blipFill>
+        <p:spPr>
+          <a:xfrm>
+            <a:off x="-24885" y="0"/>
+            <a:ext cx="12216885" cy="422694"/>
+          </a:xfrm>
+          <a:prstGeom prst="rect">
+            <a:avLst/>
+          </a:prstGeom>
+        </p:spPr>
+      </p:pic>
+    </p:spTree>
+    <p:extLst>
+      <p:ext uri="{BB962C8B-B14F-4D97-AF65-F5344CB8AC3E}">
+        <p14:creationId xmlns:p14="http://schemas.microsoft.com/office/powerpoint/2010/main" val="1260666165"/>
+      </p:ext>
+    </p:extLst>
+  </p:cSld>
+  <p:clrMapOvr>
+    <a:masterClrMapping/>
+  </p:clrMapOvr>
+  <mc:AlternateContent xmlns:mc="http://schemas.openxmlformats.org/markup-compatibility/2006" xmlns:p14="http://schemas.microsoft.com/office/powerpoint/2010/main">
+    <mc:Choice Requires="p14">
+      <p:transition p14:dur="10"/>
+    </mc:Choice>
+    <mc:Fallback xmlns="">
+      <p:transition/>
+    </mc:Fallback>
+  </mc:AlternateContent>
+</p:sld>
+</file>
+
+<file path=ppt/slides/slide5.xml><?xml version="1.0" encoding="utf-8"?>
+<p:sld xmlns:a="http://schemas.openxmlformats.org/drawingml/2006/main" xmlns:r="http://schemas.openxmlformats.org/officeDocument/2006/relationships" xmlns:p="http://schemas.openxmlformats.org/presentationml/2006/main">
+  <p:cSld>
+    <p:spTree>
+      <p:nvGrpSpPr>
+        <p:cNvPr id="1" name=""/>
+        <p:cNvGrpSpPr/>
+        <p:nvPr/>
+      </p:nvGrpSpPr>
+      <p:grpSpPr>
+        <a:xfrm>
+          <a:off x="0" y="0"/>
+          <a:ext cx="0" cy="0"/>
+          <a:chOff x="0" y="0"/>
+          <a:chExt cx="0" cy="0"/>
+        </a:xfrm>
+      </p:grpSpPr>
+      <p:pic>
+        <p:nvPicPr>
+          <p:cNvPr id="13" name="Imagem 12">
+            <a:extLst>
+              <a:ext uri="{FF2B5EF4-FFF2-40B4-BE49-F238E27FC236}">
+                <a16:creationId xmlns:a16="http://schemas.microsoft.com/office/drawing/2014/main" id="{E0203AA7-AD6C-46F7-B2EF-C74C5F8D0B49}"/>
+              </a:ext>
+            </a:extLst>
+          </p:cNvPr>
+          <p:cNvPicPr>
+            <a:picLocks noChangeAspect="1"/>
+          </p:cNvPicPr>
+          <p:nvPr/>
+        </p:nvPicPr>
+        <p:blipFill>
+          <a:blip r:embed="rId2"/>
+          <a:stretch>
+            <a:fillRect/>
+          </a:stretch>
+        </p:blipFill>
+        <p:spPr>
+          <a:xfrm>
+            <a:off x="359434" y="445331"/>
+            <a:ext cx="11473132" cy="6361271"/>
+          </a:xfrm>
+          <a:prstGeom prst="rect">
+            <a:avLst/>
+          </a:prstGeom>
+          <a:effectLst>
+            <a:outerShdw blurRad="50800" dist="38100" dir="2700000" algn="tl" rotWithShape="0">
+              <a:prstClr val="black">
+                <a:alpha val="40000"/>
+              </a:prstClr>
+            </a:outerShdw>
+          </a:effectLst>
+        </p:spPr>
+      </p:pic>
+      <p:pic>
+        <p:nvPicPr>
+          <p:cNvPr id="15" name="Imagem 14">
+            <a:extLst>
+              <a:ext uri="{FF2B5EF4-FFF2-40B4-BE49-F238E27FC236}">
+                <a16:creationId xmlns:a16="http://schemas.microsoft.com/office/drawing/2014/main" id="{C29AA3FC-7D5F-47B0-B711-5622438461CE}"/>
+              </a:ext>
+            </a:extLst>
+          </p:cNvPr>
+          <p:cNvPicPr>
+            <a:picLocks noChangeAspect="1"/>
+          </p:cNvPicPr>
+          <p:nvPr/>
+        </p:nvPicPr>
+        <p:blipFill>
+          <a:blip r:embed="rId3"/>
+          <a:stretch>
+            <a:fillRect/>
+          </a:stretch>
+        </p:blipFill>
+        <p:spPr>
+          <a:xfrm>
+            <a:off x="-1" y="0"/>
+            <a:ext cx="12192000" cy="445331"/>
+          </a:xfrm>
+          <a:prstGeom prst="rect">
+            <a:avLst/>
+          </a:prstGeom>
+        </p:spPr>
+      </p:pic>
+    </p:spTree>
+    <p:extLst>
+      <p:ext uri="{BB962C8B-B14F-4D97-AF65-F5344CB8AC3E}">
+        <p14:creationId xmlns:p14="http://schemas.microsoft.com/office/powerpoint/2010/main" val="564867060"/>
+      </p:ext>
+    </p:extLst>
+  </p:cSld>
+  <p:clrMapOvr>
+    <a:masterClrMapping/>
+  </p:clrMapOvr>
+  <mc:AlternateContent xmlns:mc="http://schemas.openxmlformats.org/markup-compatibility/2006" xmlns:p14="http://schemas.microsoft.com/office/powerpoint/2010/main">
+    <mc:Choice Requires="p14">
+      <p:transition p14:dur="10"/>
+    </mc:Choice>
+    <mc:Fallback xmlns="">
+      <p:transition/>
+    </mc:Fallback>
+  </mc:AlternateContent>
+</p:sld>
+</file>
+
+<file path=ppt/slides/slide6.xml><?xml version="1.0" encoding="utf-8"?>
+<p:sld xmlns:a="http://schemas.openxmlformats.org/drawingml/2006/main" xmlns:r="http://schemas.openxmlformats.org/officeDocument/2006/relationships" xmlns:p="http://schemas.openxmlformats.org/presentationml/2006/main">
+  <p:cSld>
+    <p:spTree>
+      <p:nvGrpSpPr>
+        <p:cNvPr id="1" name=""/>
+        <p:cNvGrpSpPr/>
+        <p:nvPr/>
+      </p:nvGrpSpPr>
+      <p:grpSpPr>
+        <a:xfrm>
+          <a:off x="0" y="0"/>
+          <a:ext cx="0" cy="0"/>
+          <a:chOff x="0" y="0"/>
+          <a:chExt cx="0" cy="0"/>
+        </a:xfrm>
+      </p:grpSpPr>
+      <p:pic>
+        <p:nvPicPr>
+          <p:cNvPr id="9" name="Imagem 8">
+            <a:extLst>
+              <a:ext uri="{FF2B5EF4-FFF2-40B4-BE49-F238E27FC236}">
+                <a16:creationId xmlns:a16="http://schemas.microsoft.com/office/drawing/2014/main" id="{8BFCB35F-A634-4A4A-B6C4-D6C7B3A7CD69}"/>
+              </a:ext>
+            </a:extLst>
+          </p:cNvPr>
+          <p:cNvPicPr>
+            <a:picLocks noChangeAspect="1"/>
+          </p:cNvPicPr>
+          <p:nvPr/>
+        </p:nvPicPr>
+        <p:blipFill>
+          <a:blip r:embed="rId2"/>
+          <a:stretch>
+            <a:fillRect/>
+          </a:stretch>
+        </p:blipFill>
+        <p:spPr>
+          <a:xfrm>
+            <a:off x="-1" y="170361"/>
+            <a:ext cx="12135525" cy="461063"/>
+          </a:xfrm>
+          <a:prstGeom prst="rect">
+            <a:avLst/>
+          </a:prstGeom>
+          <a:effectLst/>
+        </p:spPr>
+      </p:pic>
+      <p:pic>
+        <p:nvPicPr>
+          <p:cNvPr id="14" name="Imagem 13">
+            <a:extLst>
+              <a:ext uri="{FF2B5EF4-FFF2-40B4-BE49-F238E27FC236}">
+                <a16:creationId xmlns:a16="http://schemas.microsoft.com/office/drawing/2014/main" id="{7DDD8F81-E97F-4958-97E2-089C263E7A16}"/>
+              </a:ext>
+            </a:extLst>
+          </p:cNvPr>
+          <p:cNvPicPr>
+            <a:picLocks noChangeAspect="1"/>
+          </p:cNvPicPr>
+          <p:nvPr/>
+        </p:nvPicPr>
+        <p:blipFill>
+          <a:blip r:embed="rId3"/>
+          <a:stretch>
+            <a:fillRect/>
+          </a:stretch>
+        </p:blipFill>
+        <p:spPr>
+          <a:xfrm>
+            <a:off x="33597" y="802256"/>
+            <a:ext cx="12124806" cy="5963020"/>
+          </a:xfrm>
+          <a:prstGeom prst="rect">
+            <a:avLst/>
+          </a:prstGeom>
+          <a:effectLst>
+            <a:outerShdw blurRad="50800" dist="38100" dir="2700000" algn="tl" rotWithShape="0">
+              <a:prstClr val="black">
+                <a:alpha val="40000"/>
+              </a:prstClr>
+            </a:outerShdw>
+          </a:effectLst>
+        </p:spPr>
+      </p:pic>
+    </p:spTree>
+    <p:extLst>
+      <p:ext uri="{BB962C8B-B14F-4D97-AF65-F5344CB8AC3E}">
+        <p14:creationId xmlns:p14="http://schemas.microsoft.com/office/powerpoint/2010/main" val="3015794695"/>
+      </p:ext>
+    </p:extLst>
+  </p:cSld>
+  <p:clrMapOvr>
+    <a:masterClrMapping/>
+  </p:clrMapOvr>
+</p:sld>
+</file>
+
+<file path=ppt/slides/slide7.xml><?xml version="1.0" encoding="utf-8"?>
+<p:sld xmlns:a="http://schemas.openxmlformats.org/drawingml/2006/main" xmlns:r="http://schemas.openxmlformats.org/officeDocument/2006/relationships" xmlns:p="http://schemas.openxmlformats.org/presentationml/2006/main">
+  <p:cSld>
+    <p:bg>
+      <p:bgPr>
+        <a:solidFill>
+          <a:schemeClr val="bg1"/>
+        </a:solidFill>
+        <a:effectLst/>
+      </p:bgPr>
+    </p:bg>
+    <p:spTree>
+      <p:nvGrpSpPr>
+        <p:cNvPr id="1" name=""/>
+        <p:cNvGrpSpPr/>
+        <p:nvPr/>
+      </p:nvGrpSpPr>
+      <p:grpSpPr>
+        <a:xfrm>
+          <a:off x="0" y="0"/>
+          <a:ext cx="0" cy="0"/>
+          <a:chOff x="0" y="0"/>
+          <a:chExt cx="0" cy="0"/>
+        </a:xfrm>
+      </p:grpSpPr>
+      <p:pic>
+        <p:nvPicPr>
+          <p:cNvPr id="5" name="Imagem 4" descr="Tabela&#10;&#10;Descrição gerada automaticamente">
+            <a:extLst>
+              <a:ext uri="{FF2B5EF4-FFF2-40B4-BE49-F238E27FC236}">
+                <a16:creationId xmlns:a16="http://schemas.microsoft.com/office/drawing/2014/main" id="{32216C0A-BFD9-4332-8673-6EA41AC3C983}"/>
+              </a:ext>
+            </a:extLst>
+          </p:cNvPr>
+          <p:cNvPicPr>
+            <a:picLocks noChangeAspect="1"/>
+          </p:cNvPicPr>
+          <p:nvPr/>
+        </p:nvPicPr>
+        <p:blipFill>
+          <a:blip r:embed="rId2"/>
+          <a:stretch>
+            <a:fillRect/>
+          </a:stretch>
+        </p:blipFill>
+        <p:spPr>
+          <a:xfrm>
+            <a:off x="152400" y="85725"/>
+            <a:ext cx="11887200" cy="6686549"/>
+          </a:xfrm>
+          <a:prstGeom prst="rect">
+            <a:avLst/>
+          </a:prstGeom>
+          <a:effectLst>
+            <a:outerShdw blurRad="50800" dist="38100" dir="2700000" algn="tl" rotWithShape="0">
+              <a:prstClr val="black">
+                <a:alpha val="40000"/>
+              </a:prstClr>
+            </a:outerShdw>
+          </a:effectLst>
+        </p:spPr>
+      </p:pic>
+    </p:spTree>
+    <p:extLst>
+      <p:ext uri="{BB962C8B-B14F-4D97-AF65-F5344CB8AC3E}">
+        <p14:creationId xmlns:p14="http://schemas.microsoft.com/office/powerpoint/2010/main" val="3328689743"/>
+      </p:ext>
+    </p:extLst>
+  </p:cSld>
+  <p:clrMapOvr>
+    <a:masterClrMapping/>
+  </p:clrMapOvr>
+  <mc:AlternateContent xmlns:mc="http://schemas.openxmlformats.org/markup-compatibility/2006" xmlns:p14="http://schemas.microsoft.com/office/powerpoint/2010/main">
+    <mc:Choice Requires="p14">
+      <p:transition p14:dur="10"/>
+    </mc:Choice>
+    <mc:Fallback xmlns="">
+      <p:transition/>
+    </mc:Fallback>
+  </mc:AlternateContent>
+</p:sld>
+</file>
+
+<file path=ppt/slides/slide8.xml><?xml version="1.0" encoding="utf-8"?>
+<p:sld xmlns:a="http://schemas.openxmlformats.org/drawingml/2006/main" xmlns:r="http://schemas.openxmlformats.org/officeDocument/2006/relationships" xmlns:p="http://schemas.openxmlformats.org/presentationml/2006/main">
+  <p:cSld>
+    <p:spTree>
+      <p:nvGrpSpPr>
+        <p:cNvPr id="1" name=""/>
+        <p:cNvGrpSpPr/>
+        <p:nvPr/>
+      </p:nvGrpSpPr>
+      <p:grpSpPr>
+        <a:xfrm>
+          <a:off x="0" y="0"/>
+          <a:ext cx="0" cy="0"/>
+          <a:chOff x="0" y="0"/>
+          <a:chExt cx="0" cy="0"/>
+        </a:xfrm>
+      </p:grpSpPr>
+      <p:pic>
+        <p:nvPicPr>
+          <p:cNvPr id="10" name="Imagem 9">
+            <a:extLst>
+              <a:ext uri="{FF2B5EF4-FFF2-40B4-BE49-F238E27FC236}">
+                <a16:creationId xmlns:a16="http://schemas.microsoft.com/office/drawing/2014/main" id="{69FAE0FA-69AF-41E1-A05B-A759E59A2425}"/>
+              </a:ext>
+            </a:extLst>
+          </p:cNvPr>
+          <p:cNvPicPr>
+            <a:picLocks noChangeAspect="1"/>
+          </p:cNvPicPr>
+          <p:nvPr/>
+        </p:nvPicPr>
+        <p:blipFill>
+          <a:blip r:embed="rId2"/>
+          <a:stretch>
+            <a:fillRect/>
+          </a:stretch>
+        </p:blipFill>
+        <p:spPr>
+          <a:xfrm>
+            <a:off x="33283" y="1594442"/>
+            <a:ext cx="12125433" cy="3669116"/>
+          </a:xfrm>
+          <a:prstGeom prst="rect">
+            <a:avLst/>
+          </a:prstGeom>
+          <a:effectLst>
+            <a:outerShdw blurRad="50800" dist="38100" dir="2700000" algn="tl" rotWithShape="0">
+              <a:prstClr val="black">
+                <a:alpha val="40000"/>
+              </a:prstClr>
+            </a:outerShdw>
+          </a:effectLst>
+        </p:spPr>
+      </p:pic>
+      <p:sp>
+        <p:nvSpPr>
+          <p:cNvPr id="13" name="CaixaDeTexto 12">
+            <a:extLst>
+              <a:ext uri="{FF2B5EF4-FFF2-40B4-BE49-F238E27FC236}">
+                <a16:creationId xmlns:a16="http://schemas.microsoft.com/office/drawing/2014/main" id="{17B81743-4CE9-4C89-8616-EBBEEA32D729}"/>
+              </a:ext>
+            </a:extLst>
+          </p:cNvPr>
+          <p:cNvSpPr txBox="1"/>
+          <p:nvPr/>
+        </p:nvSpPr>
+        <p:spPr>
+          <a:xfrm>
+            <a:off x="32062" y="968652"/>
+            <a:ext cx="6506761" cy="261610"/>
+          </a:xfrm>
+          <a:prstGeom prst="rect">
+            <a:avLst/>
+          </a:prstGeom>
+          <a:noFill/>
+        </p:spPr>
+        <p:txBody>
+          <a:bodyPr wrap="square" rtlCol="0">
+            <a:spAutoFit/>
+          </a:bodyPr>
+          <a:lstStyle/>
+          <a:p>
+            <a:r>
+              <a:rPr lang="pt-BR" sz="1100" dirty="0">
+                <a:latin typeface="Calibri  "/>
+              </a:rPr>
+              <a:t>- Este é o caderno modelo com os resultados finais da análise, que foi enviado juntamente com a apresentação.</a:t>
+            </a:r>
+          </a:p>
+        </p:txBody>
+      </p:sp>
+      <p:pic>
+        <p:nvPicPr>
+          <p:cNvPr id="18" name="Imagem 17">
+            <a:extLst>
+              <a:ext uri="{FF2B5EF4-FFF2-40B4-BE49-F238E27FC236}">
+                <a16:creationId xmlns:a16="http://schemas.microsoft.com/office/drawing/2014/main" id="{10A44309-CBBF-4387-B1B9-4EEE36168897}"/>
+              </a:ext>
+            </a:extLst>
+          </p:cNvPr>
+          <p:cNvPicPr>
+            <a:picLocks noChangeAspect="1"/>
+          </p:cNvPicPr>
+          <p:nvPr/>
+        </p:nvPicPr>
+        <p:blipFill>
+          <a:blip r:embed="rId3"/>
+          <a:stretch>
+            <a:fillRect/>
+          </a:stretch>
+        </p:blipFill>
+        <p:spPr>
+          <a:xfrm>
+            <a:off x="0" y="0"/>
+            <a:ext cx="12192000" cy="862484"/>
+          </a:xfrm>
+          <a:prstGeom prst="rect">
+            <a:avLst/>
+          </a:prstGeom>
+        </p:spPr>
+      </p:pic>
+    </p:spTree>
+    <p:extLst>
+      <p:ext uri="{BB962C8B-B14F-4D97-AF65-F5344CB8AC3E}">
+        <p14:creationId xmlns:p14="http://schemas.microsoft.com/office/powerpoint/2010/main" val="1251569096"/>
+      </p:ext>
+    </p:extLst>
+  </p:cSld>
+  <p:clrMapOvr>
+    <a:masterClrMapping/>
+  </p:clrMapOvr>
+</p:sld>
+</file>
+
+<file path=ppt/slides/slide9.xml><?xml version="1.0" encoding="utf-8"?>
+<p:sld xmlns:a="http://schemas.openxmlformats.org/drawingml/2006/main" xmlns:r="http://schemas.openxmlformats.org/officeDocument/2006/relationships" xmlns:p="http://schemas.openxmlformats.org/presentationml/2006/main">
+  <p:cSld>
+    <p:spTree>
+      <p:nvGrpSpPr>
+        <p:cNvPr id="1" name=""/>
+        <p:cNvGrpSpPr/>
+        <p:nvPr/>
+      </p:nvGrpSpPr>
+      <p:grpSpPr>
+        <a:xfrm>
+          <a:off x="0" y="0"/>
+          <a:ext cx="0" cy="0"/>
+          <a:chOff x="0" y="0"/>
+          <a:chExt cx="0" cy="0"/>
+        </a:xfrm>
+      </p:grpSpPr>
+      <p:pic>
+        <p:nvPicPr>
+          <p:cNvPr id="7" name="Imagem 6">
+            <a:extLst>
+              <a:ext uri="{FF2B5EF4-FFF2-40B4-BE49-F238E27FC236}">
+                <a16:creationId xmlns:a16="http://schemas.microsoft.com/office/drawing/2014/main" id="{9C07296C-F9AF-4722-89A1-0775CF6C57A4}"/>
+              </a:ext>
+            </a:extLst>
+          </p:cNvPr>
+          <p:cNvPicPr>
+            <a:picLocks noChangeAspect="1"/>
+          </p:cNvPicPr>
+          <p:nvPr/>
+        </p:nvPicPr>
+        <p:blipFill>
+          <a:blip r:embed="rId2"/>
+          <a:stretch>
+            <a:fillRect/>
+          </a:stretch>
+        </p:blipFill>
+        <p:spPr>
+          <a:xfrm>
+            <a:off x="177267" y="99204"/>
+            <a:ext cx="11837466" cy="6659592"/>
+          </a:xfrm>
+          <a:prstGeom prst="rect">
+            <a:avLst/>
+          </a:prstGeom>
+          <a:effectLst>
+            <a:outerShdw blurRad="50800" dist="38100" dir="2700000" algn="tl" rotWithShape="0">
+              <a:prstClr val="black">
+                <a:alpha val="40000"/>
+              </a:prstClr>
+            </a:outerShdw>
+          </a:effectLst>
+        </p:spPr>
+      </p:pic>
+    </p:spTree>
+    <p:extLst>
+      <p:ext uri="{BB962C8B-B14F-4D97-AF65-F5344CB8AC3E}">
+        <p14:creationId xmlns:p14="http://schemas.microsoft.com/office/powerpoint/2010/main" val="4093100218"/>
+      </p:ext>
+    </p:extLst>
+  </p:cSld>
+  <p:clrMapOvr>
+    <a:masterClrMapping/>
+  </p:clrMapOvr>
+  <mc:AlternateContent xmlns:mc="http://schemas.openxmlformats.org/markup-compatibility/2006" xmlns:p14="http://schemas.microsoft.com/office/powerpoint/2010/main">
+    <mc:Choice Requires="p14">
+      <p:transition p14:dur="10"/>
+    </mc:Choice>
+    <mc:Fallback xmlns="">
+      <p:transition/>
+    </mc:Fallback>
+  </mc:AlternateContent>
 </p:sld>
 </file>
 

</xml_diff>

<commit_message>
Atualização do Power Point.
</commit_message>
<xml_diff>
--- a/Power Point/apresentacao.pptx
+++ b/Power Point/apresentacao.pptx
@@ -134,7 +134,7 @@
   <pc:docChgLst>
     <pc:chgData name="Luiz Phelipe Utiama Sempreboni" userId="3f5f3216-6838-42b4-8f95-953f983fe7ed" providerId="ADAL" clId="{4F74A316-CE39-4334-8D64-99330089639C}"/>
     <pc:docChg chg="undo redo custSel addSld modSld sldOrd">
-      <pc:chgData name="Luiz Phelipe Utiama Sempreboni" userId="3f5f3216-6838-42b4-8f95-953f983fe7ed" providerId="ADAL" clId="{4F74A316-CE39-4334-8D64-99330089639C}" dt="2021-07-16T16:48:36.835" v="245" actId="14861"/>
+      <pc:chgData name="Luiz Phelipe Utiama Sempreboni" userId="3f5f3216-6838-42b4-8f95-953f983fe7ed" providerId="ADAL" clId="{4F74A316-CE39-4334-8D64-99330089639C}" dt="2021-07-17T01:50:37.411" v="249" actId="20577"/>
       <pc:docMkLst>
         <pc:docMk/>
       </pc:docMkLst>
@@ -197,6 +197,36 @@
           <pc:docMk/>
           <pc:sldMk cId="1260666165" sldId="261"/>
         </pc:sldMkLst>
+      </pc:sldChg>
+      <pc:sldChg chg="modSp mod">
+        <pc:chgData name="Luiz Phelipe Utiama Sempreboni" userId="3f5f3216-6838-42b4-8f95-953f983fe7ed" providerId="ADAL" clId="{4F74A316-CE39-4334-8D64-99330089639C}" dt="2021-07-17T01:50:37.411" v="249" actId="20577"/>
+        <pc:sldMkLst>
+          <pc:docMk/>
+          <pc:sldMk cId="2610024198" sldId="263"/>
+        </pc:sldMkLst>
+        <pc:spChg chg="mod">
+          <ac:chgData name="Luiz Phelipe Utiama Sempreboni" userId="3f5f3216-6838-42b4-8f95-953f983fe7ed" providerId="ADAL" clId="{4F74A316-CE39-4334-8D64-99330089639C}" dt="2021-07-17T01:50:37.411" v="249" actId="20577"/>
+          <ac:spMkLst>
+            <pc:docMk/>
+            <pc:sldMk cId="2610024198" sldId="263"/>
+            <ac:spMk id="6" creationId="{C82E9230-2776-46E3-8032-C48BB586882F}"/>
+          </ac:spMkLst>
+        </pc:spChg>
+      </pc:sldChg>
+      <pc:sldChg chg="modSp mod">
+        <pc:chgData name="Luiz Phelipe Utiama Sempreboni" userId="3f5f3216-6838-42b4-8f95-953f983fe7ed" providerId="ADAL" clId="{4F74A316-CE39-4334-8D64-99330089639C}" dt="2021-07-17T01:49:33.045" v="247" actId="20577"/>
+        <pc:sldMkLst>
+          <pc:docMk/>
+          <pc:sldMk cId="2892981272" sldId="265"/>
+        </pc:sldMkLst>
+        <pc:spChg chg="mod">
+          <ac:chgData name="Luiz Phelipe Utiama Sempreboni" userId="3f5f3216-6838-42b4-8f95-953f983fe7ed" providerId="ADAL" clId="{4F74A316-CE39-4334-8D64-99330089639C}" dt="2021-07-17T01:49:33.045" v="247" actId="20577"/>
+          <ac:spMkLst>
+            <pc:docMk/>
+            <pc:sldMk cId="2892981272" sldId="265"/>
+            <ac:spMk id="2" creationId="{1C518439-7F3B-4F92-BAB7-F298893E9C82}"/>
+          </ac:spMkLst>
+        </pc:spChg>
       </pc:sldChg>
       <pc:sldChg chg="addSp delSp modSp add mod">
         <pc:chgData name="Luiz Phelipe Utiama Sempreboni" userId="3f5f3216-6838-42b4-8f95-953f983fe7ed" providerId="ADAL" clId="{4F74A316-CE39-4334-8D64-99330089639C}" dt="2021-07-16T16:44:08.789" v="229" actId="1076"/>
@@ -16064,7 +16094,7 @@
                   <a:schemeClr val="bg1"/>
                 </a:solidFill>
               </a:rPr>
-              <a:t>Análise de dados de campanha de Marketing para o Ifood </a:t>
+              <a:t>Análise de dados da campanha de Marketing para o Ifood </a:t>
             </a:r>
           </a:p>
         </p:txBody>
@@ -16755,7 +16785,7 @@
             </a:br>
             <a:r>
               <a:rPr lang="pt-BR" sz="3000" b="1" dirty="0"/>
-              <a:t>Estou á disposição para dúvidas, feedbacks e conversas!</a:t>
+              <a:t>Estou à disposição para dúvidas, feedbacks e conversas!</a:t>
             </a:r>
           </a:p>
         </p:txBody>

</xml_diff>